<commit_message>
G4: worked on presentation
</commit_message>
<xml_diff>
--- a/groups/04-logMerge/presentations/endpresentation.pptx
+++ b/groups/04-logMerge/presentations/endpresentation.pptx
@@ -11,7 +11,7 @@
     <p:sldId id="268" r:id="rId5"/>
     <p:sldId id="269" r:id="rId6"/>
     <p:sldId id="264" r:id="rId7"/>
-    <p:sldId id="265" r:id="rId8"/>
+    <p:sldId id="270" r:id="rId8"/>
     <p:sldId id="259" r:id="rId9"/>
   </p:sldIdLst>
   <p:sldSz cx="12192000" cy="6858000"/>
@@ -214,7 +214,7 @@
           <a:effectLst/>
           <a:extLst>
             <a:ext uri="{91240B29-F687-4f45-9708-019B960494DF}">
-              <a14:hiddenLine xmlns="" xmlns:a14="http://schemas.microsoft.com/office/drawing/2010/main" w="9525">
+              <a14:hiddenLine xmlns:a14="http://schemas.microsoft.com/office/drawing/2010/main" xmlns="" w="9525">
                 <a:solidFill>
                   <a:srgbClr val="000000"/>
                 </a:solidFill>
@@ -1724,7 +1724,7 @@
           <a:ln/>
           <a:extLst>
             <a:ext uri="{91240B29-F687-4f45-9708-019B960494DF}">
-              <a14:hiddenLine xmlns="" xmlns:a14="http://schemas.microsoft.com/office/drawing/2010/main" w="9525">
+              <a14:hiddenLine xmlns:a14="http://schemas.microsoft.com/office/drawing/2010/main" xmlns="" w="9525">
                 <a:solidFill>
                   <a:srgbClr val="000000"/>
                 </a:solidFill>
@@ -1996,7 +1996,7 @@
           <a:ln/>
           <a:extLst>
             <a:ext uri="{91240B29-F687-4f45-9708-019B960494DF}">
-              <a14:hiddenLine xmlns="" xmlns:a14="http://schemas.microsoft.com/office/drawing/2010/main" w="9525">
+              <a14:hiddenLine xmlns:a14="http://schemas.microsoft.com/office/drawing/2010/main" xmlns="" w="9525">
                 <a:solidFill>
                   <a:srgbClr val="000000"/>
                 </a:solidFill>
@@ -2276,7 +2276,7 @@
           <a:ln/>
           <a:extLst>
             <a:ext uri="{91240B29-F687-4f45-9708-019B960494DF}">
-              <a14:hiddenLine xmlns="" xmlns:a14="http://schemas.microsoft.com/office/drawing/2010/main" w="9525">
+              <a14:hiddenLine xmlns:a14="http://schemas.microsoft.com/office/drawing/2010/main" xmlns="" w="9525">
                 <a:solidFill>
                   <a:srgbClr val="000000"/>
                 </a:solidFill>
@@ -2896,7 +2896,7 @@
           <a:ln/>
           <a:extLst>
             <a:ext uri="{91240B29-F687-4f45-9708-019B960494DF}">
-              <a14:hiddenLine xmlns="" xmlns:a14="http://schemas.microsoft.com/office/drawing/2010/main" w="9525">
+              <a14:hiddenLine xmlns:a14="http://schemas.microsoft.com/office/drawing/2010/main" xmlns="" w="9525">
                 <a:solidFill>
                   <a:srgbClr val="000000"/>
                 </a:solidFill>
@@ -3232,7 +3232,7 @@
           <a:ln/>
           <a:extLst>
             <a:ext uri="{91240B29-F687-4f45-9708-019B960494DF}">
-              <a14:hiddenLine xmlns="" xmlns:a14="http://schemas.microsoft.com/office/drawing/2010/main" w="9525">
+              <a14:hiddenLine xmlns:a14="http://schemas.microsoft.com/office/drawing/2010/main" xmlns="" w="9525">
                 <a:solidFill>
                   <a:srgbClr val="000000"/>
                 </a:solidFill>
@@ -3706,7 +3706,7 @@
           <a:ln/>
           <a:extLst>
             <a:ext uri="{91240B29-F687-4f45-9708-019B960494DF}">
-              <a14:hiddenLine xmlns="" xmlns:a14="http://schemas.microsoft.com/office/drawing/2010/main" w="9525">
+              <a14:hiddenLine xmlns:a14="http://schemas.microsoft.com/office/drawing/2010/main" xmlns="" w="9525">
                 <a:solidFill>
                   <a:srgbClr val="000000"/>
                 </a:solidFill>
@@ -4129,7 +4129,7 @@
           <a:ln/>
           <a:extLst>
             <a:ext uri="{91240B29-F687-4f45-9708-019B960494DF}">
-              <a14:hiddenLine xmlns="" xmlns:a14="http://schemas.microsoft.com/office/drawing/2010/main" w="9525">
+              <a14:hiddenLine xmlns:a14="http://schemas.microsoft.com/office/drawing/2010/main" xmlns="" w="9525">
                 <a:solidFill>
                   <a:srgbClr val="000000"/>
                 </a:solidFill>
@@ -8836,10 +8836,10 @@
       </p:sp>
       <p:sp>
         <p:nvSpPr>
-          <p:cNvPr id="4" name="Rectangle: Rounded Corners 3">
+          <p:cNvPr id="7" name="Rectangle: Rounded Corners 6">
             <a:extLst>
               <a:ext uri="{FF2B5EF4-FFF2-40B4-BE49-F238E27FC236}">
-                <a16:creationId xmlns:a16="http://schemas.microsoft.com/office/drawing/2014/main" id="{1626E350-A2F7-4342-B0B2-04BD8BD223B9}"/>
+                <a16:creationId xmlns:a16="http://schemas.microsoft.com/office/drawing/2014/main" id="{A4538659-839A-4E6A-A372-411445A7F618}"/>
               </a:ext>
             </a:extLst>
           </p:cNvPr>
@@ -8848,8 +8848,8 @@
         </p:nvSpPr>
         <p:spPr>
           <a:xfrm>
-            <a:off x="810000" y="2740231"/>
-            <a:ext cx="10571998" cy="1377538"/>
+            <a:off x="810000" y="2320639"/>
+            <a:ext cx="10571998" cy="437403"/>
           </a:xfrm>
           <a:prstGeom prst="roundRect">
             <a:avLst/>
@@ -8884,19 +8884,19 @@
           <a:lstStyle/>
           <a:p>
             <a:r>
-              <a:rPr lang="en-US" dirty="0" err="1"/>
-              <a:t>dsf</a:t>
-            </a:r>
-            <a:endParaRPr lang="en-DE" dirty="0"/>
-          </a:p>
-        </p:txBody>
-      </p:sp>
-      <p:sp>
-        <p:nvSpPr>
-          <p:cNvPr id="14" name="Rectangle: Rounded Corners 13">
+              <a:rPr lang="en-US" sz="2000" dirty="0"/>
+              <a:t>pip install .</a:t>
+            </a:r>
+            <a:endParaRPr lang="en-DE" sz="2000" dirty="0"/>
+          </a:p>
+        </p:txBody>
+      </p:sp>
+      <p:sp>
+        <p:nvSpPr>
+          <p:cNvPr id="9" name="Rectangle: Rounded Corners 8">
             <a:extLst>
               <a:ext uri="{FF2B5EF4-FFF2-40B4-BE49-F238E27FC236}">
-                <a16:creationId xmlns:a16="http://schemas.microsoft.com/office/drawing/2014/main" id="{A01633DA-3156-4FAD-BD8D-CFF2C361870A}"/>
+                <a16:creationId xmlns:a16="http://schemas.microsoft.com/office/drawing/2014/main" id="{25CA1383-B09E-4F1C-8EA7-03D73CEAF73F}"/>
               </a:ext>
             </a:extLst>
           </p:cNvPr>
@@ -8905,8 +8905,8 @@
         </p:nvSpPr>
         <p:spPr>
           <a:xfrm>
-            <a:off x="810000" y="4359233"/>
-            <a:ext cx="10571998" cy="1377538"/>
+            <a:off x="810000" y="2884721"/>
+            <a:ext cx="10571998" cy="877824"/>
           </a:xfrm>
           <a:prstGeom prst="roundRect">
             <a:avLst/>
@@ -8940,11 +8940,433 @@
           <a:bodyPr rtlCol="0" anchor="ctr"/>
           <a:lstStyle/>
           <a:p>
-            <a:pPr algn="ctr"/>
-            <a:endParaRPr lang="en-DE"/>
-          </a:p>
-        </p:txBody>
-      </p:sp>
+            <a:r>
+              <a:rPr lang="en-US" sz="2000" dirty="0"/>
+              <a:t>import </a:t>
+            </a:r>
+            <a:r>
+              <a:rPr lang="en-US" sz="2000" dirty="0" err="1"/>
+              <a:t>LogMerge</a:t>
+            </a:r>
+            <a:endParaRPr lang="en-US" sz="2000" dirty="0"/>
+          </a:p>
+          <a:p>
+            <a:r>
+              <a:rPr lang="en-US" sz="2000" dirty="0" err="1"/>
+              <a:t>lm</a:t>
+            </a:r>
+            <a:r>
+              <a:rPr lang="en-US" sz="2000" dirty="0"/>
+              <a:t> = </a:t>
+            </a:r>
+            <a:r>
+              <a:rPr lang="en-US" sz="2000" dirty="0" err="1"/>
+              <a:t>LogMerge.LogMerge</a:t>
+            </a:r>
+            <a:r>
+              <a:rPr lang="en-US" sz="2000" dirty="0"/>
+              <a:t>()</a:t>
+            </a:r>
+          </a:p>
+        </p:txBody>
+      </p:sp>
+      <p:sp>
+        <p:nvSpPr>
+          <p:cNvPr id="10" name="Rectangle: Rounded Corners 9">
+            <a:extLst>
+              <a:ext uri="{FF2B5EF4-FFF2-40B4-BE49-F238E27FC236}">
+                <a16:creationId xmlns:a16="http://schemas.microsoft.com/office/drawing/2014/main" id="{5C5FD72D-B8EF-4AB6-939F-E54F5E5EC445}"/>
+              </a:ext>
+            </a:extLst>
+          </p:cNvPr>
+          <p:cNvSpPr/>
+          <p:nvPr/>
+        </p:nvSpPr>
+        <p:spPr>
+          <a:xfrm>
+            <a:off x="810000" y="3889224"/>
+            <a:ext cx="10571998" cy="437403"/>
+          </a:xfrm>
+          <a:prstGeom prst="roundRect">
+            <a:avLst/>
+          </a:prstGeom>
+          <a:solidFill>
+            <a:schemeClr val="tx2"/>
+          </a:solidFill>
+          <a:ln>
+            <a:solidFill>
+              <a:schemeClr val="accent1"/>
+            </a:solidFill>
+          </a:ln>
+        </p:spPr>
+        <p:style>
+          <a:lnRef idx="2">
+            <a:schemeClr val="accent1">
+              <a:shade val="50000"/>
+            </a:schemeClr>
+          </a:lnRef>
+          <a:fillRef idx="1">
+            <a:schemeClr val="accent1"/>
+          </a:fillRef>
+          <a:effectRef idx="0">
+            <a:schemeClr val="accent1"/>
+          </a:effectRef>
+          <a:fontRef idx="minor">
+            <a:schemeClr val="lt1"/>
+          </a:fontRef>
+        </p:style>
+        <p:txBody>
+          <a:bodyPr rtlCol="0" anchor="ctr"/>
+          <a:lstStyle/>
+          <a:p>
+            <a:r>
+              <a:rPr lang="en-US" sz="2000" dirty="0" err="1"/>
+              <a:t>database_status</a:t>
+            </a:r>
+            <a:r>
+              <a:rPr lang="en-US" sz="2000" dirty="0"/>
+              <a:t> = </a:t>
+            </a:r>
+            <a:r>
+              <a:rPr lang="en-US" sz="2000" dirty="0" err="1"/>
+              <a:t>lm.get_database_status</a:t>
+            </a:r>
+            <a:r>
+              <a:rPr lang="en-US" sz="2000" dirty="0"/>
+              <a:t>()</a:t>
+            </a:r>
+            <a:endParaRPr lang="en-DE" sz="2000" dirty="0"/>
+          </a:p>
+        </p:txBody>
+      </p:sp>
+      <p:sp>
+        <p:nvSpPr>
+          <p:cNvPr id="11" name="Rectangle: Rounded Corners 10">
+            <a:extLst>
+              <a:ext uri="{FF2B5EF4-FFF2-40B4-BE49-F238E27FC236}">
+                <a16:creationId xmlns:a16="http://schemas.microsoft.com/office/drawing/2014/main" id="{42B91A79-D896-4CD0-8386-354C432A5BC2}"/>
+              </a:ext>
+            </a:extLst>
+          </p:cNvPr>
+          <p:cNvSpPr/>
+          <p:nvPr/>
+        </p:nvSpPr>
+        <p:spPr>
+          <a:xfrm>
+            <a:off x="810000" y="5022390"/>
+            <a:ext cx="10571998" cy="437403"/>
+          </a:xfrm>
+          <a:prstGeom prst="roundRect">
+            <a:avLst/>
+          </a:prstGeom>
+          <a:solidFill>
+            <a:schemeClr val="tx2"/>
+          </a:solidFill>
+          <a:ln>
+            <a:solidFill>
+              <a:schemeClr val="accent1"/>
+            </a:solidFill>
+          </a:ln>
+        </p:spPr>
+        <p:style>
+          <a:lnRef idx="2">
+            <a:schemeClr val="accent1">
+              <a:shade val="50000"/>
+            </a:schemeClr>
+          </a:lnRef>
+          <a:fillRef idx="1">
+            <a:schemeClr val="accent1"/>
+          </a:fillRef>
+          <a:effectRef idx="0">
+            <a:schemeClr val="accent1"/>
+          </a:effectRef>
+          <a:fontRef idx="minor">
+            <a:schemeClr val="lt1"/>
+          </a:fontRef>
+        </p:style>
+        <p:txBody>
+          <a:bodyPr rtlCol="0" anchor="ctr"/>
+          <a:lstStyle/>
+          <a:p>
+            <a:r>
+              <a:rPr lang="en-US" sz="2000" dirty="0" err="1"/>
+              <a:t>lm.export_logs</a:t>
+            </a:r>
+            <a:r>
+              <a:rPr lang="en-US" sz="2000" dirty="0"/>
+              <a:t>(</a:t>
+            </a:r>
+            <a:r>
+              <a:rPr lang="en-US" sz="2000" dirty="0" err="1"/>
+              <a:t>save_path</a:t>
+            </a:r>
+            <a:r>
+              <a:rPr lang="en-US" sz="2000" dirty="0"/>
+              <a:t>, </a:t>
+            </a:r>
+            <a:r>
+              <a:rPr lang="en-US" sz="2000" dirty="0" err="1"/>
+              <a:t>current_status</a:t>
+            </a:r>
+            <a:r>
+              <a:rPr lang="en-US" sz="2000" dirty="0"/>
+              <a:t>)                                                    </a:t>
+            </a:r>
+            <a:r>
+              <a:rPr lang="en-US" sz="2000" dirty="0">
+                <a:sym typeface="Wingdings" panose="05000000000000000000" pitchFamily="2" charset="2"/>
+              </a:rPr>
+              <a:t> .</a:t>
+            </a:r>
+            <a:r>
+              <a:rPr lang="en-US" sz="2000" dirty="0" err="1">
+                <a:sym typeface="Wingdings" panose="05000000000000000000" pitchFamily="2" charset="2"/>
+              </a:rPr>
+              <a:t>pcap</a:t>
+            </a:r>
+            <a:r>
+              <a:rPr lang="en-US" sz="2000" dirty="0">
+                <a:sym typeface="Wingdings" panose="05000000000000000000" pitchFamily="2" charset="2"/>
+              </a:rPr>
+              <a:t> files</a:t>
+            </a:r>
+            <a:endParaRPr lang="en-DE" sz="2000" dirty="0"/>
+          </a:p>
+        </p:txBody>
+      </p:sp>
+      <p:sp>
+        <p:nvSpPr>
+          <p:cNvPr id="13" name="Rectangle: Rounded Corners 12">
+            <a:extLst>
+              <a:ext uri="{FF2B5EF4-FFF2-40B4-BE49-F238E27FC236}">
+                <a16:creationId xmlns:a16="http://schemas.microsoft.com/office/drawing/2014/main" id="{59BD25EC-CF8B-4ACE-8012-C3F6C097F159}"/>
+              </a:ext>
+            </a:extLst>
+          </p:cNvPr>
+          <p:cNvSpPr/>
+          <p:nvPr/>
+        </p:nvSpPr>
+        <p:spPr>
+          <a:xfrm>
+            <a:off x="810000" y="4455807"/>
+            <a:ext cx="10571998" cy="437403"/>
+          </a:xfrm>
+          <a:prstGeom prst="roundRect">
+            <a:avLst/>
+          </a:prstGeom>
+          <a:solidFill>
+            <a:schemeClr val="tx2"/>
+          </a:solidFill>
+          <a:ln>
+            <a:solidFill>
+              <a:schemeClr val="accent1"/>
+            </a:solidFill>
+          </a:ln>
+        </p:spPr>
+        <p:style>
+          <a:lnRef idx="2">
+            <a:schemeClr val="accent1">
+              <a:shade val="50000"/>
+            </a:schemeClr>
+          </a:lnRef>
+          <a:fillRef idx="1">
+            <a:schemeClr val="accent1"/>
+          </a:fillRef>
+          <a:effectRef idx="0">
+            <a:schemeClr val="accent1"/>
+          </a:effectRef>
+          <a:fontRef idx="minor">
+            <a:schemeClr val="lt1"/>
+          </a:fontRef>
+        </p:style>
+        <p:txBody>
+          <a:bodyPr rtlCol="0" anchor="ctr"/>
+          <a:lstStyle/>
+          <a:p>
+            <a:r>
+              <a:rPr lang="en-US" sz="2000" dirty="0" err="1"/>
+              <a:t>lm.import_logs</a:t>
+            </a:r>
+            <a:r>
+              <a:rPr lang="en-US" sz="2000" dirty="0"/>
+              <a:t>(</a:t>
+            </a:r>
+            <a:r>
+              <a:rPr lang="en-US" sz="2000" dirty="0" err="1"/>
+              <a:t>path_to_pcap_files</a:t>
+            </a:r>
+            <a:r>
+              <a:rPr lang="en-US" sz="2000" dirty="0"/>
+              <a:t>)</a:t>
+            </a:r>
+            <a:endParaRPr lang="en-DE" sz="2000" dirty="0"/>
+          </a:p>
+        </p:txBody>
+      </p:sp>
+      <p:sp>
+        <p:nvSpPr>
+          <p:cNvPr id="15" name="TextBox 14">
+            <a:extLst>
+              <a:ext uri="{FF2B5EF4-FFF2-40B4-BE49-F238E27FC236}">
+                <a16:creationId xmlns:a16="http://schemas.microsoft.com/office/drawing/2014/main" id="{ED299B4C-6E2D-42AC-BECB-0F2209D1D833}"/>
+              </a:ext>
+            </a:extLst>
+          </p:cNvPr>
+          <p:cNvSpPr txBox="1"/>
+          <p:nvPr/>
+        </p:nvSpPr>
+        <p:spPr>
+          <a:xfrm>
+            <a:off x="810000" y="5856814"/>
+            <a:ext cx="1469622" cy="553998"/>
+          </a:xfrm>
+          <a:prstGeom prst="rect">
+            <a:avLst/>
+          </a:prstGeom>
+          <a:noFill/>
+        </p:spPr>
+        <p:txBody>
+          <a:bodyPr wrap="square" rtlCol="0">
+            <a:spAutoFit/>
+          </a:bodyPr>
+          <a:lstStyle/>
+          <a:p>
+            <a:r>
+              <a:rPr lang="en-US" sz="3000" b="1" dirty="0">
+                <a:solidFill>
+                  <a:schemeClr val="accent6"/>
+                </a:solidFill>
+              </a:rPr>
+              <a:t>Intern:</a:t>
+            </a:r>
+            <a:endParaRPr lang="en-DE" sz="3000" b="1" dirty="0">
+              <a:solidFill>
+                <a:schemeClr val="accent6"/>
+              </a:solidFill>
+            </a:endParaRPr>
+          </a:p>
+        </p:txBody>
+      </p:sp>
+      <p:pic>
+        <p:nvPicPr>
+          <p:cNvPr id="20" name="Picture 19" descr="A picture containing clock, drawing&#10;&#10;Description automatically generated">
+            <a:extLst>
+              <a:ext uri="{FF2B5EF4-FFF2-40B4-BE49-F238E27FC236}">
+                <a16:creationId xmlns:a16="http://schemas.microsoft.com/office/drawing/2014/main" id="{14E70226-1959-45C9-B850-D7C61CB63FE6}"/>
+              </a:ext>
+            </a:extLst>
+          </p:cNvPr>
+          <p:cNvPicPr>
+            <a:picLocks noChangeAspect="1"/>
+          </p:cNvPicPr>
+          <p:nvPr/>
+        </p:nvPicPr>
+        <p:blipFill>
+          <a:blip r:embed="rId2"/>
+          <a:stretch>
+            <a:fillRect/>
+          </a:stretch>
+        </p:blipFill>
+        <p:spPr>
+          <a:xfrm>
+            <a:off x="2682601" y="5625683"/>
+            <a:ext cx="1522256" cy="1171205"/>
+          </a:xfrm>
+          <a:prstGeom prst="rect">
+            <a:avLst/>
+          </a:prstGeom>
+        </p:spPr>
+      </p:pic>
+      <p:pic>
+        <p:nvPicPr>
+          <p:cNvPr id="22" name="Picture 21" descr="A picture containing clock&#10;&#10;Description automatically generated">
+            <a:extLst>
+              <a:ext uri="{FF2B5EF4-FFF2-40B4-BE49-F238E27FC236}">
+                <a16:creationId xmlns:a16="http://schemas.microsoft.com/office/drawing/2014/main" id="{481CE635-BF54-43D4-8C42-98245DB42528}"/>
+              </a:ext>
+            </a:extLst>
+          </p:cNvPr>
+          <p:cNvPicPr>
+            <a:picLocks noChangeAspect="1"/>
+          </p:cNvPicPr>
+          <p:nvPr/>
+        </p:nvPicPr>
+        <p:blipFill>
+          <a:blip r:embed="rId3"/>
+          <a:stretch>
+            <a:fillRect/>
+          </a:stretch>
+        </p:blipFill>
+        <p:spPr>
+          <a:xfrm>
+            <a:off x="5393666" y="5579661"/>
+            <a:ext cx="1258317" cy="1258317"/>
+          </a:xfrm>
+          <a:prstGeom prst="rect">
+            <a:avLst/>
+          </a:prstGeom>
+        </p:spPr>
+      </p:pic>
+      <p:pic>
+        <p:nvPicPr>
+          <p:cNvPr id="24" name="Picture 23" descr="A picture containing clock, sign&#10;&#10;Description automatically generated">
+            <a:extLst>
+              <a:ext uri="{FF2B5EF4-FFF2-40B4-BE49-F238E27FC236}">
+                <a16:creationId xmlns:a16="http://schemas.microsoft.com/office/drawing/2014/main" id="{A403CFE3-1D07-440F-A000-00E70A879D2F}"/>
+              </a:ext>
+            </a:extLst>
+          </p:cNvPr>
+          <p:cNvPicPr>
+            <a:picLocks noChangeAspect="1"/>
+          </p:cNvPicPr>
+          <p:nvPr/>
+        </p:nvPicPr>
+        <p:blipFill>
+          <a:blip r:embed="rId4"/>
+          <a:stretch>
+            <a:fillRect/>
+          </a:stretch>
+        </p:blipFill>
+        <p:spPr>
+          <a:xfrm>
+            <a:off x="7840792" y="5631241"/>
+            <a:ext cx="1121307" cy="1158974"/>
+          </a:xfrm>
+          <a:prstGeom prst="rect">
+            <a:avLst/>
+          </a:prstGeom>
+        </p:spPr>
+      </p:pic>
+      <p:pic>
+        <p:nvPicPr>
+          <p:cNvPr id="26" name="Picture 25" descr="A close up of a sign&#10;&#10;Description automatically generated">
+            <a:extLst>
+              <a:ext uri="{FF2B5EF4-FFF2-40B4-BE49-F238E27FC236}">
+                <a16:creationId xmlns:a16="http://schemas.microsoft.com/office/drawing/2014/main" id="{0A27D837-8749-4CB1-99E1-EBD5B4279CBB}"/>
+              </a:ext>
+            </a:extLst>
+          </p:cNvPr>
+          <p:cNvPicPr>
+            <a:picLocks noChangeAspect="1"/>
+          </p:cNvPicPr>
+          <p:nvPr/>
+        </p:nvPicPr>
+        <p:blipFill>
+          <a:blip r:embed="rId5"/>
+          <a:stretch>
+            <a:fillRect/>
+          </a:stretch>
+        </p:blipFill>
+        <p:spPr>
+          <a:xfrm>
+            <a:off x="10150908" y="5513098"/>
+            <a:ext cx="1091146" cy="1344901"/>
+          </a:xfrm>
+          <a:prstGeom prst="rect">
+            <a:avLst/>
+          </a:prstGeom>
+        </p:spPr>
+      </p:pic>
     </p:spTree>
     <p:extLst>
       <p:ext uri="{BB962C8B-B14F-4D97-AF65-F5344CB8AC3E}">
@@ -9012,10 +9434,543 @@
           </a:p>
         </p:txBody>
       </p:sp>
+      <p:sp>
+        <p:nvSpPr>
+          <p:cNvPr id="7" name="Rectangle: Rounded Corners 6">
+            <a:extLst>
+              <a:ext uri="{FF2B5EF4-FFF2-40B4-BE49-F238E27FC236}">
+                <a16:creationId xmlns:a16="http://schemas.microsoft.com/office/drawing/2014/main" id="{A4538659-839A-4E6A-A372-411445A7F618}"/>
+              </a:ext>
+            </a:extLst>
+          </p:cNvPr>
+          <p:cNvSpPr/>
+          <p:nvPr/>
+        </p:nvSpPr>
+        <p:spPr>
+          <a:xfrm>
+            <a:off x="810000" y="2320639"/>
+            <a:ext cx="10571998" cy="437403"/>
+          </a:xfrm>
+          <a:prstGeom prst="roundRect">
+            <a:avLst/>
+          </a:prstGeom>
+          <a:solidFill>
+            <a:schemeClr val="tx2"/>
+          </a:solidFill>
+          <a:ln>
+            <a:solidFill>
+              <a:schemeClr val="accent1"/>
+            </a:solidFill>
+          </a:ln>
+        </p:spPr>
+        <p:style>
+          <a:lnRef idx="2">
+            <a:schemeClr val="accent1">
+              <a:shade val="50000"/>
+            </a:schemeClr>
+          </a:lnRef>
+          <a:fillRef idx="1">
+            <a:schemeClr val="accent1"/>
+          </a:fillRef>
+          <a:effectRef idx="0">
+            <a:schemeClr val="accent1"/>
+          </a:effectRef>
+          <a:fontRef idx="minor">
+            <a:schemeClr val="lt1"/>
+          </a:fontRef>
+        </p:style>
+        <p:txBody>
+          <a:bodyPr rtlCol="0" anchor="ctr"/>
+          <a:lstStyle/>
+          <a:p>
+            <a:r>
+              <a:rPr lang="en-US" sz="2000" dirty="0"/>
+              <a:t>pip install .</a:t>
+            </a:r>
+            <a:endParaRPr lang="en-DE" sz="2000" dirty="0"/>
+          </a:p>
+        </p:txBody>
+      </p:sp>
+      <p:sp>
+        <p:nvSpPr>
+          <p:cNvPr id="9" name="Rectangle: Rounded Corners 8">
+            <a:extLst>
+              <a:ext uri="{FF2B5EF4-FFF2-40B4-BE49-F238E27FC236}">
+                <a16:creationId xmlns:a16="http://schemas.microsoft.com/office/drawing/2014/main" id="{25CA1383-B09E-4F1C-8EA7-03D73CEAF73F}"/>
+              </a:ext>
+            </a:extLst>
+          </p:cNvPr>
+          <p:cNvSpPr/>
+          <p:nvPr/>
+        </p:nvSpPr>
+        <p:spPr>
+          <a:xfrm>
+            <a:off x="810000" y="2884721"/>
+            <a:ext cx="10571998" cy="877824"/>
+          </a:xfrm>
+          <a:prstGeom prst="roundRect">
+            <a:avLst/>
+          </a:prstGeom>
+          <a:solidFill>
+            <a:schemeClr val="tx2"/>
+          </a:solidFill>
+          <a:ln>
+            <a:solidFill>
+              <a:schemeClr val="accent1"/>
+            </a:solidFill>
+          </a:ln>
+        </p:spPr>
+        <p:style>
+          <a:lnRef idx="2">
+            <a:schemeClr val="accent1">
+              <a:shade val="50000"/>
+            </a:schemeClr>
+          </a:lnRef>
+          <a:fillRef idx="1">
+            <a:schemeClr val="accent1"/>
+          </a:fillRef>
+          <a:effectRef idx="0">
+            <a:schemeClr val="accent1"/>
+          </a:effectRef>
+          <a:fontRef idx="minor">
+            <a:schemeClr val="lt1"/>
+          </a:fontRef>
+        </p:style>
+        <p:txBody>
+          <a:bodyPr rtlCol="0" anchor="ctr"/>
+          <a:lstStyle/>
+          <a:p>
+            <a:r>
+              <a:rPr lang="en-US" sz="2000" dirty="0"/>
+              <a:t>import </a:t>
+            </a:r>
+            <a:r>
+              <a:rPr lang="en-US" sz="2000" dirty="0" err="1"/>
+              <a:t>LogMerge</a:t>
+            </a:r>
+            <a:endParaRPr lang="en-US" sz="2000" dirty="0"/>
+          </a:p>
+          <a:p>
+            <a:r>
+              <a:rPr lang="en-US" sz="2000" dirty="0" err="1"/>
+              <a:t>lm</a:t>
+            </a:r>
+            <a:r>
+              <a:rPr lang="en-US" sz="2000" dirty="0"/>
+              <a:t> = </a:t>
+            </a:r>
+            <a:r>
+              <a:rPr lang="en-US" sz="2000" dirty="0" err="1"/>
+              <a:t>LogMerge.LogMerge</a:t>
+            </a:r>
+            <a:r>
+              <a:rPr lang="en-US" sz="2000" dirty="0"/>
+              <a:t>()</a:t>
+            </a:r>
+          </a:p>
+        </p:txBody>
+      </p:sp>
+      <p:sp>
+        <p:nvSpPr>
+          <p:cNvPr id="10" name="Rectangle: Rounded Corners 9">
+            <a:extLst>
+              <a:ext uri="{FF2B5EF4-FFF2-40B4-BE49-F238E27FC236}">
+                <a16:creationId xmlns:a16="http://schemas.microsoft.com/office/drawing/2014/main" id="{5C5FD72D-B8EF-4AB6-939F-E54F5E5EC445}"/>
+              </a:ext>
+            </a:extLst>
+          </p:cNvPr>
+          <p:cNvSpPr/>
+          <p:nvPr/>
+        </p:nvSpPr>
+        <p:spPr>
+          <a:xfrm>
+            <a:off x="810000" y="3889224"/>
+            <a:ext cx="10571998" cy="437403"/>
+          </a:xfrm>
+          <a:prstGeom prst="roundRect">
+            <a:avLst/>
+          </a:prstGeom>
+          <a:solidFill>
+            <a:schemeClr val="tx2"/>
+          </a:solidFill>
+          <a:ln>
+            <a:solidFill>
+              <a:schemeClr val="accent1"/>
+            </a:solidFill>
+          </a:ln>
+        </p:spPr>
+        <p:style>
+          <a:lnRef idx="2">
+            <a:schemeClr val="accent1">
+              <a:shade val="50000"/>
+            </a:schemeClr>
+          </a:lnRef>
+          <a:fillRef idx="1">
+            <a:schemeClr val="accent1"/>
+          </a:fillRef>
+          <a:effectRef idx="0">
+            <a:schemeClr val="accent1"/>
+          </a:effectRef>
+          <a:fontRef idx="minor">
+            <a:schemeClr val="lt1"/>
+          </a:fontRef>
+        </p:style>
+        <p:txBody>
+          <a:bodyPr rtlCol="0" anchor="ctr"/>
+          <a:lstStyle/>
+          <a:p>
+            <a:r>
+              <a:rPr lang="en-US" sz="2000" dirty="0" err="1"/>
+              <a:t>database_status</a:t>
+            </a:r>
+            <a:r>
+              <a:rPr lang="en-US" sz="2000" dirty="0"/>
+              <a:t> = </a:t>
+            </a:r>
+            <a:r>
+              <a:rPr lang="en-US" sz="2000" dirty="0" err="1"/>
+              <a:t>lm.get_database_status</a:t>
+            </a:r>
+            <a:r>
+              <a:rPr lang="en-US" sz="2000" dirty="0"/>
+              <a:t>()</a:t>
+            </a:r>
+            <a:endParaRPr lang="en-DE" sz="2000" dirty="0"/>
+          </a:p>
+        </p:txBody>
+      </p:sp>
+      <p:sp>
+        <p:nvSpPr>
+          <p:cNvPr id="11" name="Rectangle: Rounded Corners 10">
+            <a:extLst>
+              <a:ext uri="{FF2B5EF4-FFF2-40B4-BE49-F238E27FC236}">
+                <a16:creationId xmlns:a16="http://schemas.microsoft.com/office/drawing/2014/main" id="{42B91A79-D896-4CD0-8386-354C432A5BC2}"/>
+              </a:ext>
+            </a:extLst>
+          </p:cNvPr>
+          <p:cNvSpPr/>
+          <p:nvPr/>
+        </p:nvSpPr>
+        <p:spPr>
+          <a:xfrm>
+            <a:off x="810000" y="5022390"/>
+            <a:ext cx="10571998" cy="437403"/>
+          </a:xfrm>
+          <a:prstGeom prst="roundRect">
+            <a:avLst/>
+          </a:prstGeom>
+          <a:solidFill>
+            <a:schemeClr val="tx2"/>
+          </a:solidFill>
+          <a:ln>
+            <a:solidFill>
+              <a:schemeClr val="accent1"/>
+            </a:solidFill>
+          </a:ln>
+        </p:spPr>
+        <p:style>
+          <a:lnRef idx="2">
+            <a:schemeClr val="accent1">
+              <a:shade val="50000"/>
+            </a:schemeClr>
+          </a:lnRef>
+          <a:fillRef idx="1">
+            <a:schemeClr val="accent1"/>
+          </a:fillRef>
+          <a:effectRef idx="0">
+            <a:schemeClr val="accent1"/>
+          </a:effectRef>
+          <a:fontRef idx="minor">
+            <a:schemeClr val="lt1"/>
+          </a:fontRef>
+        </p:style>
+        <p:txBody>
+          <a:bodyPr rtlCol="0" anchor="ctr"/>
+          <a:lstStyle/>
+          <a:p>
+            <a:r>
+              <a:rPr lang="en-US" sz="2000" dirty="0" err="1"/>
+              <a:t>lm.export_logs</a:t>
+            </a:r>
+            <a:r>
+              <a:rPr lang="en-US" sz="2000" dirty="0"/>
+              <a:t>(</a:t>
+            </a:r>
+            <a:r>
+              <a:rPr lang="en-US" sz="2000" dirty="0" err="1"/>
+              <a:t>save_path</a:t>
+            </a:r>
+            <a:r>
+              <a:rPr lang="en-US" sz="2000" dirty="0"/>
+              <a:t>, </a:t>
+            </a:r>
+            <a:r>
+              <a:rPr lang="en-US" sz="2000" dirty="0" err="1"/>
+              <a:t>current_status</a:t>
+            </a:r>
+            <a:r>
+              <a:rPr lang="en-US" sz="2000" dirty="0"/>
+              <a:t>)                                                    </a:t>
+            </a:r>
+            <a:r>
+              <a:rPr lang="en-US" sz="2000" dirty="0">
+                <a:sym typeface="Wingdings" panose="05000000000000000000" pitchFamily="2" charset="2"/>
+              </a:rPr>
+              <a:t> .</a:t>
+            </a:r>
+            <a:r>
+              <a:rPr lang="en-US" sz="2000" dirty="0" err="1">
+                <a:sym typeface="Wingdings" panose="05000000000000000000" pitchFamily="2" charset="2"/>
+              </a:rPr>
+              <a:t>pcap</a:t>
+            </a:r>
+            <a:r>
+              <a:rPr lang="en-US" sz="2000" dirty="0">
+                <a:sym typeface="Wingdings" panose="05000000000000000000" pitchFamily="2" charset="2"/>
+              </a:rPr>
+              <a:t> files</a:t>
+            </a:r>
+            <a:endParaRPr lang="en-DE" sz="2000" dirty="0"/>
+          </a:p>
+        </p:txBody>
+      </p:sp>
+      <p:sp>
+        <p:nvSpPr>
+          <p:cNvPr id="13" name="Rectangle: Rounded Corners 12">
+            <a:extLst>
+              <a:ext uri="{FF2B5EF4-FFF2-40B4-BE49-F238E27FC236}">
+                <a16:creationId xmlns:a16="http://schemas.microsoft.com/office/drawing/2014/main" id="{59BD25EC-CF8B-4ACE-8012-C3F6C097F159}"/>
+              </a:ext>
+            </a:extLst>
+          </p:cNvPr>
+          <p:cNvSpPr/>
+          <p:nvPr/>
+        </p:nvSpPr>
+        <p:spPr>
+          <a:xfrm>
+            <a:off x="810000" y="4455807"/>
+            <a:ext cx="10571998" cy="437403"/>
+          </a:xfrm>
+          <a:prstGeom prst="roundRect">
+            <a:avLst/>
+          </a:prstGeom>
+          <a:solidFill>
+            <a:schemeClr val="tx2"/>
+          </a:solidFill>
+          <a:ln>
+            <a:solidFill>
+              <a:schemeClr val="accent1"/>
+            </a:solidFill>
+          </a:ln>
+        </p:spPr>
+        <p:style>
+          <a:lnRef idx="2">
+            <a:schemeClr val="accent1">
+              <a:shade val="50000"/>
+            </a:schemeClr>
+          </a:lnRef>
+          <a:fillRef idx="1">
+            <a:schemeClr val="accent1"/>
+          </a:fillRef>
+          <a:effectRef idx="0">
+            <a:schemeClr val="accent1"/>
+          </a:effectRef>
+          <a:fontRef idx="minor">
+            <a:schemeClr val="lt1"/>
+          </a:fontRef>
+        </p:style>
+        <p:txBody>
+          <a:bodyPr rtlCol="0" anchor="ctr"/>
+          <a:lstStyle/>
+          <a:p>
+            <a:r>
+              <a:rPr lang="en-US" sz="2000" dirty="0" err="1"/>
+              <a:t>lm.import_logs</a:t>
+            </a:r>
+            <a:r>
+              <a:rPr lang="en-US" sz="2000" dirty="0"/>
+              <a:t>(</a:t>
+            </a:r>
+            <a:r>
+              <a:rPr lang="en-US" sz="2000" dirty="0" err="1"/>
+              <a:t>path_to_pcap_files</a:t>
+            </a:r>
+            <a:r>
+              <a:rPr lang="en-US" sz="2000" dirty="0"/>
+              <a:t>)</a:t>
+            </a:r>
+            <a:endParaRPr lang="en-DE" sz="2000" dirty="0"/>
+          </a:p>
+        </p:txBody>
+      </p:sp>
+      <p:sp>
+        <p:nvSpPr>
+          <p:cNvPr id="15" name="TextBox 14">
+            <a:extLst>
+              <a:ext uri="{FF2B5EF4-FFF2-40B4-BE49-F238E27FC236}">
+                <a16:creationId xmlns:a16="http://schemas.microsoft.com/office/drawing/2014/main" id="{ED299B4C-6E2D-42AC-BECB-0F2209D1D833}"/>
+              </a:ext>
+            </a:extLst>
+          </p:cNvPr>
+          <p:cNvSpPr txBox="1"/>
+          <p:nvPr/>
+        </p:nvSpPr>
+        <p:spPr>
+          <a:xfrm>
+            <a:off x="810000" y="5856814"/>
+            <a:ext cx="1469622" cy="553998"/>
+          </a:xfrm>
+          <a:prstGeom prst="rect">
+            <a:avLst/>
+          </a:prstGeom>
+          <a:noFill/>
+        </p:spPr>
+        <p:txBody>
+          <a:bodyPr wrap="square" rtlCol="0">
+            <a:spAutoFit/>
+          </a:bodyPr>
+          <a:lstStyle/>
+          <a:p>
+            <a:r>
+              <a:rPr lang="en-US" sz="3000" b="1" dirty="0">
+                <a:solidFill>
+                  <a:schemeClr val="accent6"/>
+                </a:solidFill>
+              </a:rPr>
+              <a:t>Intern:</a:t>
+            </a:r>
+            <a:endParaRPr lang="en-DE" sz="3000" b="1" dirty="0">
+              <a:solidFill>
+                <a:schemeClr val="accent6"/>
+              </a:solidFill>
+            </a:endParaRPr>
+          </a:p>
+        </p:txBody>
+      </p:sp>
+      <p:pic>
+        <p:nvPicPr>
+          <p:cNvPr id="20" name="Picture 19" descr="A picture containing clock, drawing&#10;&#10;Description automatically generated">
+            <a:extLst>
+              <a:ext uri="{FF2B5EF4-FFF2-40B4-BE49-F238E27FC236}">
+                <a16:creationId xmlns:a16="http://schemas.microsoft.com/office/drawing/2014/main" id="{14E70226-1959-45C9-B850-D7C61CB63FE6}"/>
+              </a:ext>
+            </a:extLst>
+          </p:cNvPr>
+          <p:cNvPicPr>
+            <a:picLocks noChangeAspect="1"/>
+          </p:cNvPicPr>
+          <p:nvPr/>
+        </p:nvPicPr>
+        <p:blipFill>
+          <a:blip r:embed="rId2"/>
+          <a:stretch>
+            <a:fillRect/>
+          </a:stretch>
+        </p:blipFill>
+        <p:spPr>
+          <a:xfrm>
+            <a:off x="2682601" y="5625683"/>
+            <a:ext cx="1522256" cy="1171205"/>
+          </a:xfrm>
+          <a:prstGeom prst="rect">
+            <a:avLst/>
+          </a:prstGeom>
+        </p:spPr>
+      </p:pic>
+      <p:pic>
+        <p:nvPicPr>
+          <p:cNvPr id="22" name="Picture 21" descr="A picture containing clock&#10;&#10;Description automatically generated">
+            <a:extLst>
+              <a:ext uri="{FF2B5EF4-FFF2-40B4-BE49-F238E27FC236}">
+                <a16:creationId xmlns:a16="http://schemas.microsoft.com/office/drawing/2014/main" id="{481CE635-BF54-43D4-8C42-98245DB42528}"/>
+              </a:ext>
+            </a:extLst>
+          </p:cNvPr>
+          <p:cNvPicPr>
+            <a:picLocks noChangeAspect="1"/>
+          </p:cNvPicPr>
+          <p:nvPr/>
+        </p:nvPicPr>
+        <p:blipFill>
+          <a:blip r:embed="rId3"/>
+          <a:stretch>
+            <a:fillRect/>
+          </a:stretch>
+        </p:blipFill>
+        <p:spPr>
+          <a:xfrm>
+            <a:off x="5393666" y="5579661"/>
+            <a:ext cx="1258317" cy="1258317"/>
+          </a:xfrm>
+          <a:prstGeom prst="rect">
+            <a:avLst/>
+          </a:prstGeom>
+        </p:spPr>
+      </p:pic>
+      <p:pic>
+        <p:nvPicPr>
+          <p:cNvPr id="24" name="Picture 23" descr="A picture containing clock, sign&#10;&#10;Description automatically generated">
+            <a:extLst>
+              <a:ext uri="{FF2B5EF4-FFF2-40B4-BE49-F238E27FC236}">
+                <a16:creationId xmlns:a16="http://schemas.microsoft.com/office/drawing/2014/main" id="{A403CFE3-1D07-440F-A000-00E70A879D2F}"/>
+              </a:ext>
+            </a:extLst>
+          </p:cNvPr>
+          <p:cNvPicPr>
+            <a:picLocks noChangeAspect="1"/>
+          </p:cNvPicPr>
+          <p:nvPr/>
+        </p:nvPicPr>
+        <p:blipFill>
+          <a:blip r:embed="rId4"/>
+          <a:stretch>
+            <a:fillRect/>
+          </a:stretch>
+        </p:blipFill>
+        <p:spPr>
+          <a:xfrm>
+            <a:off x="7840792" y="5631241"/>
+            <a:ext cx="1121307" cy="1158974"/>
+          </a:xfrm>
+          <a:prstGeom prst="rect">
+            <a:avLst/>
+          </a:prstGeom>
+        </p:spPr>
+      </p:pic>
+      <p:pic>
+        <p:nvPicPr>
+          <p:cNvPr id="26" name="Picture 25" descr="A close up of a sign&#10;&#10;Description automatically generated">
+            <a:extLst>
+              <a:ext uri="{FF2B5EF4-FFF2-40B4-BE49-F238E27FC236}">
+                <a16:creationId xmlns:a16="http://schemas.microsoft.com/office/drawing/2014/main" id="{0A27D837-8749-4CB1-99E1-EBD5B4279CBB}"/>
+              </a:ext>
+            </a:extLst>
+          </p:cNvPr>
+          <p:cNvPicPr>
+            <a:picLocks noChangeAspect="1"/>
+          </p:cNvPicPr>
+          <p:nvPr/>
+        </p:nvPicPr>
+        <p:blipFill>
+          <a:blip r:embed="rId5"/>
+          <a:stretch>
+            <a:fillRect/>
+          </a:stretch>
+        </p:blipFill>
+        <p:spPr>
+          <a:xfrm>
+            <a:off x="10150908" y="5513098"/>
+            <a:ext cx="1091146" cy="1344901"/>
+          </a:xfrm>
+          <a:prstGeom prst="rect">
+            <a:avLst/>
+          </a:prstGeom>
+        </p:spPr>
+      </p:pic>
     </p:spTree>
     <p:extLst>
       <p:ext uri="{BB962C8B-B14F-4D97-AF65-F5344CB8AC3E}">
-        <p14:creationId xmlns:p14="http://schemas.microsoft.com/office/powerpoint/2010/main" val="3042148466"/>
+        <p14:creationId xmlns:p14="http://schemas.microsoft.com/office/powerpoint/2010/main" val="1442984713"/>
       </p:ext>
     </p:extLst>
   </p:cSld>
@@ -9145,7 +10100,7 @@
           <a:effectLst/>
           <a:extLst>
             <a:ext uri="{91240B29-F687-4f45-9708-019B960494DF}">
-              <a14:hiddenLine xmlns="" xmlns:a14="http://schemas.microsoft.com/office/drawing/2010/main" xmlns:a16="http://schemas.microsoft.com/office/drawing/2014/main" w="9525">
+              <a14:hiddenLine xmlns:a16="http://schemas.microsoft.com/office/drawing/2014/main" xmlns:a14="http://schemas.microsoft.com/office/drawing/2010/main" xmlns="" w="9525">
                 <a:solidFill>
                   <a:srgbClr val="000000"/>
                 </a:solidFill>
@@ -9516,7 +10471,7 @@
           <a:effectLst/>
           <a:extLst>
             <a:ext uri="{91240B29-F687-4f45-9708-019B960494DF}">
-              <a14:hiddenLine xmlns="" xmlns:a14="http://schemas.microsoft.com/office/drawing/2010/main" xmlns:p14="http://schemas.microsoft.com/office/powerpoint/2010/main" xmlns:a16="http://schemas.microsoft.com/office/drawing/2014/main" w="9525">
+              <a14:hiddenLine xmlns:a16="http://schemas.microsoft.com/office/drawing/2014/main" xmlns:p14="http://schemas.microsoft.com/office/powerpoint/2010/main" xmlns:a14="http://schemas.microsoft.com/office/drawing/2010/main" xmlns="" w="9525">
                 <a:solidFill>
                   <a:srgbClr val="000000"/>
                 </a:solidFill>

</xml_diff>